<commit_message>
docs(community): updates on exercises and new presentations
</commit_message>
<xml_diff>
--- a/community-events/content/presentations/introduction-contoso-real-state.pptx
+++ b/community-events/content/presentations/introduction-contoso-real-state.pptx
@@ -2201,6 +2201,33 @@
             <a:r>
               <a:rPr lang="pt-BR" dirty="0"/>
               <a:t>Note: you can show how to enable codespaces https://docs.github.com/en/codespaces/getting-started/quickstart</a:t>
+            </a:r>
+          </a:p>
+          <a:p>
+            <a:pPr marL="0" lvl="0" indent="0" algn="l" rtl="0">
+              <a:spcBef>
+                <a:spcPts val="0"/>
+              </a:spcBef>
+              <a:spcAft>
+                <a:spcPts val="0"/>
+              </a:spcAft>
+              <a:buNone/>
+            </a:pPr>
+            <a:endParaRPr lang="pt-BR" dirty="0"/>
+          </a:p>
+          <a:p>
+            <a:pPr marL="0" lvl="0" indent="0" algn="l" rtl="0">
+              <a:spcBef>
+                <a:spcPts val="0"/>
+              </a:spcBef>
+              <a:spcAft>
+                <a:spcPts val="0"/>
+              </a:spcAft>
+              <a:buNone/>
+            </a:pPr>
+            <a:r>
+              <a:rPr lang="pt-BR" dirty="0"/>
+              <a:t>Copilot offers 60-day trial</a:t>
             </a:r>
             <a:endParaRPr dirty="0"/>
           </a:p>
@@ -11604,7 +11631,7 @@
 </file>
 
 <file path=ppt/slides/slide10.xml><?xml version="1.0" encoding="utf-8"?>
-<p:sld xmlns:a="http://schemas.openxmlformats.org/drawingml/2006/main" xmlns:r="http://schemas.openxmlformats.org/officeDocument/2006/relationships" xmlns:p="http://schemas.openxmlformats.org/presentationml/2006/main">
+<p:sld xmlns:a="http://schemas.openxmlformats.org/drawingml/2006/main" xmlns:r="http://schemas.openxmlformats.org/officeDocument/2006/relationships" xmlns:p="http://schemas.openxmlformats.org/presentationml/2006/main" show="0">
   <p:cSld>
     <p:spTree>
       <p:nvGrpSpPr>
@@ -11620,6 +11647,129 @@
           <a:chExt cx="0" cy="0"/>
         </a:xfrm>
       </p:grpSpPr>
+      <p:sp>
+        <p:nvSpPr>
+          <p:cNvPr id="2" name="TextBox 1">
+            <a:extLst>
+              <a:ext uri="{FF2B5EF4-FFF2-40B4-BE49-F238E27FC236}">
+                <a16:creationId xmlns:a16="http://schemas.microsoft.com/office/drawing/2014/main" id="{E844861D-5607-2D60-C13E-9F34464D2502}"/>
+              </a:ext>
+            </a:extLst>
+          </p:cNvPr>
+          <p:cNvSpPr txBox="1"/>
+          <p:nvPr/>
+        </p:nvSpPr>
+        <p:spPr>
+          <a:xfrm>
+            <a:off x="601206" y="2096194"/>
+            <a:ext cx="7482799" cy="769441"/>
+          </a:xfrm>
+          <a:prstGeom prst="rect">
+            <a:avLst/>
+          </a:prstGeom>
+          <a:noFill/>
+        </p:spPr>
+        <p:txBody>
+          <a:bodyPr wrap="square">
+            <a:spAutoFit/>
+          </a:bodyPr>
+          <a:lstStyle/>
+          <a:p>
+            <a:pPr marL="0" lvl="0" indent="0" defTabSz="914400" eaLnBrk="1" fontAlgn="auto" latinLnBrk="0" hangingPunct="1">
+              <a:buClrTx/>
+              <a:buSzTx/>
+              <a:buFont typeface="Arial"/>
+              <a:buNone/>
+              <a:tabLst/>
+              <a:defRPr/>
+            </a:pPr>
+            <a:r>
+              <a:rPr kumimoji="0" lang="pt-BR" sz="2200" b="0" i="0" u="none" strike="noStrike" kern="1200" cap="none" spc="-38" normalizeH="0" baseline="0" noProof="0" dirty="0">
+                <a:ln w="3175">
+                  <a:noFill/>
+                </a:ln>
+                <a:solidFill>
+                  <a:srgbClr val="101A26"/>
+                </a:solidFill>
+                <a:effectLst/>
+                <a:uLnTx/>
+                <a:uFillTx/>
+                <a:latin typeface="Segoe UI Semibold"/>
+                <a:cs typeface="Arial"/>
+                <a:sym typeface="Arial"/>
+              </a:rPr>
+              <a:t>A</a:t>
+            </a:r>
+            <a:r>
+              <a:rPr kumimoji="0" lang="en-US" sz="2200" b="0" i="0" u="none" strike="noStrike" kern="1200" cap="none" spc="-38" normalizeH="0" baseline="0" noProof="0" dirty="0">
+                <a:ln w="3175">
+                  <a:noFill/>
+                </a:ln>
+                <a:solidFill>
+                  <a:srgbClr val="101A26"/>
+                </a:solidFill>
+                <a:effectLst/>
+                <a:uLnTx/>
+                <a:uFillTx/>
+                <a:latin typeface="Segoe UI Semibold"/>
+                <a:cs typeface="Arial"/>
+                <a:sym typeface="Arial"/>
+              </a:rPr>
+              <a:t>t this moment, you can run a</a:t>
+            </a:r>
+            <a:r>
+              <a:rPr lang="en-US" sz="2200" kern="1200" spc="-38" dirty="0">
+                <a:ln w="3175">
+                  <a:noFill/>
+                </a:ln>
+                <a:solidFill>
+                  <a:srgbClr val="101A26"/>
+                </a:solidFill>
+                <a:latin typeface="Segoe UI Semibold"/>
+              </a:rPr>
+              <a:t> demonstration of Contoso Real Estate on </a:t>
+            </a:r>
+            <a:r>
+              <a:rPr lang="en-US" sz="2200" kern="1200" spc="-38" dirty="0" err="1">
+                <a:ln w="3175">
+                  <a:noFill/>
+                </a:ln>
+                <a:solidFill>
+                  <a:srgbClr val="101A26"/>
+                </a:solidFill>
+                <a:latin typeface="Segoe UI Semibold"/>
+              </a:rPr>
+              <a:t>Codespace</a:t>
+            </a:r>
+            <a:r>
+              <a:rPr lang="en-US" sz="2200" kern="1200" spc="-38" dirty="0">
+                <a:ln w="3175">
+                  <a:noFill/>
+                </a:ln>
+                <a:solidFill>
+                  <a:srgbClr val="101A26"/>
+                </a:solidFill>
+                <a:latin typeface="Segoe UI Semibold"/>
+              </a:rPr>
+              <a:t> or start the workshop exercise!</a:t>
+            </a:r>
+            <a:endParaRPr kumimoji="0" lang="en-US" sz="2200" b="0" i="0" u="none" strike="noStrike" kern="1200" cap="none" spc="-38" normalizeH="0" baseline="0" noProof="0" dirty="0">
+              <a:ln w="3175">
+                <a:noFill/>
+              </a:ln>
+              <a:solidFill>
+                <a:srgbClr val="101A26"/>
+              </a:solidFill>
+              <a:effectLst/>
+              <a:uLnTx/>
+              <a:uFillTx/>
+              <a:latin typeface="Segoe UI Semibold"/>
+              <a:cs typeface="Arial"/>
+              <a:sym typeface="Arial"/>
+            </a:endParaRPr>
+          </a:p>
+        </p:txBody>
+      </p:sp>
     </p:spTree>
     <p:extLst>
       <p:ext uri="{BB962C8B-B14F-4D97-AF65-F5344CB8AC3E}">
@@ -14961,182 +15111,140 @@
       </p:grpSpPr>
       <p:sp>
         <p:nvSpPr>
-          <p:cNvPr id="17" name="Google Shape;5260;p259">
+          <p:cNvPr id="6" name="TextBox 5">
             <a:extLst>
               <a:ext uri="{FF2B5EF4-FFF2-40B4-BE49-F238E27FC236}">
-                <a16:creationId xmlns:a16="http://schemas.microsoft.com/office/drawing/2014/main" id="{E196B70B-5233-FDD3-7DA2-F9687A2CA2C8}"/>
+                <a16:creationId xmlns:a16="http://schemas.microsoft.com/office/drawing/2014/main" id="{15BCCF37-C417-FE5B-7EDC-F933FE266A1E}"/>
               </a:ext>
             </a:extLst>
           </p:cNvPr>
-          <p:cNvSpPr/>
+          <p:cNvSpPr txBox="1"/>
           <p:nvPr/>
         </p:nvSpPr>
         <p:spPr>
           <a:xfrm>
-            <a:off x="496708" y="586068"/>
-            <a:ext cx="7772400" cy="914400"/>
+            <a:off x="449815" y="358650"/>
+            <a:ext cx="7482799" cy="4154984"/>
           </a:xfrm>
-          <a:prstGeom prst="roundRect">
-            <a:avLst>
-              <a:gd name="adj" fmla="val 9524"/>
-            </a:avLst>
+          <a:prstGeom prst="rect">
+            <a:avLst/>
           </a:prstGeom>
-          <a:solidFill>
-            <a:srgbClr val="0A0C10"/>
-          </a:solidFill>
-          <a:ln w="9525" cap="flat" cmpd="sng">
-            <a:solidFill>
-              <a:srgbClr val="282828"/>
-            </a:solidFill>
-            <a:prstDash val="solid"/>
-            <a:round/>
-            <a:headEnd type="none" w="sm" len="sm"/>
-            <a:tailEnd type="none" w="sm" len="sm"/>
-          </a:ln>
+          <a:noFill/>
         </p:spPr>
         <p:txBody>
-          <a:bodyPr spcFirstLastPara="1" wrap="square" lIns="91425" tIns="91425" rIns="91425" bIns="91425" anchor="ctr" anchorCtr="0">
-            <a:noAutofit/>
+          <a:bodyPr wrap="square">
+            <a:spAutoFit/>
           </a:bodyPr>
           <a:lstStyle/>
           <a:p>
-            <a:pPr algn="ctr">
+            <a:pPr marL="0" lvl="0" indent="0" defTabSz="914400" eaLnBrk="1" fontAlgn="auto" latinLnBrk="0" hangingPunct="1">
               <a:buClrTx/>
+              <a:buSzTx/>
+              <a:buFont typeface="Arial"/>
+              <a:buNone/>
+              <a:tabLst/>
+              <a:defRPr/>
             </a:pPr>
             <a:r>
-              <a:rPr lang="en-US" sz="2400" dirty="0">
-                <a:solidFill>
-                  <a:schemeClr val="bg1"/>
+              <a:rPr lang="en-US" sz="2200" dirty="0">
+                <a:solidFill>
+                  <a:srgbClr val="FFC000"/>
                 </a:solidFill>
                 <a:latin typeface="Segoe UI Semibold"/>
               </a:rPr>
-              <a:t>Azure and GitHub for Students: https://aka.ms/Copilot4Students</a:t>
+              <a:t>GitHub Student Developer Pack (including Azure for Students)</a:t>
             </a:r>
           </a:p>
-        </p:txBody>
-      </p:sp>
-      <p:sp>
-        <p:nvSpPr>
-          <p:cNvPr id="18" name="Google Shape;5269;p259">
-            <a:extLst>
-              <a:ext uri="{FF2B5EF4-FFF2-40B4-BE49-F238E27FC236}">
-                <a16:creationId xmlns:a16="http://schemas.microsoft.com/office/drawing/2014/main" id="{F344E3B2-61B2-2F04-2042-5C1345C639AF}"/>
-              </a:ext>
-            </a:extLst>
-          </p:cNvPr>
-          <p:cNvSpPr/>
-          <p:nvPr/>
-        </p:nvSpPr>
-        <p:spPr>
-          <a:xfrm>
-            <a:off x="2096908" y="1491318"/>
-            <a:ext cx="4572000" cy="18300"/>
-          </a:xfrm>
-          <a:prstGeom prst="roundRect">
-            <a:avLst>
-              <a:gd name="adj" fmla="val 50000"/>
-            </a:avLst>
-          </a:prstGeom>
-          <a:gradFill>
-            <a:gsLst>
-              <a:gs pos="0">
-                <a:schemeClr val="accent3"/>
-              </a:gs>
-              <a:gs pos="15000">
-                <a:schemeClr val="accent6"/>
-              </a:gs>
-              <a:gs pos="37000">
-                <a:schemeClr val="accent2"/>
-              </a:gs>
-              <a:gs pos="58999">
-                <a:schemeClr val="accent5"/>
-              </a:gs>
-              <a:gs pos="81000">
-                <a:schemeClr val="accent1"/>
-              </a:gs>
-              <a:gs pos="100000">
-                <a:schemeClr val="accent4"/>
-              </a:gs>
-            </a:gsLst>
-            <a:lin ang="8099331" scaled="0"/>
-          </a:gradFill>
-          <a:ln>
-            <a:noFill/>
-          </a:ln>
-        </p:spPr>
-        <p:txBody>
-          <a:bodyPr spcFirstLastPara="1" wrap="square" lIns="91425" tIns="91425" rIns="91425" bIns="91425" anchor="ctr" anchorCtr="0">
-            <a:noAutofit/>
-          </a:bodyPr>
-          <a:lstStyle/>
           <a:p>
-            <a:pPr marL="0" lvl="0" indent="0" algn="l" rtl="0">
-              <a:spcBef>
-                <a:spcPts val="0"/>
-              </a:spcBef>
-              <a:spcAft>
-                <a:spcPts val="0"/>
-              </a:spcAft>
-              <a:buNone/>
-            </a:pPr>
-            <a:endParaRPr/>
-          </a:p>
-        </p:txBody>
-      </p:sp>
-      <p:sp>
-        <p:nvSpPr>
-          <p:cNvPr id="5" name="Google Shape;5260;p259">
-            <a:extLst>
-              <a:ext uri="{FF2B5EF4-FFF2-40B4-BE49-F238E27FC236}">
-                <a16:creationId xmlns:a16="http://schemas.microsoft.com/office/drawing/2014/main" id="{306421C8-FF8B-9EE4-6BAA-E45001D5EDDE}"/>
-              </a:ext>
-            </a:extLst>
-          </p:cNvPr>
-          <p:cNvSpPr/>
-          <p:nvPr/>
-        </p:nvSpPr>
-        <p:spPr>
-          <a:xfrm>
-            <a:off x="496708" y="1881468"/>
-            <a:ext cx="7772400" cy="914400"/>
-          </a:xfrm>
-          <a:prstGeom prst="roundRect">
-            <a:avLst>
-              <a:gd name="adj" fmla="val 9524"/>
-            </a:avLst>
-          </a:prstGeom>
-          <a:solidFill>
-            <a:srgbClr val="0A0C10"/>
-          </a:solidFill>
-          <a:ln w="9525" cap="flat" cmpd="sng">
-            <a:solidFill>
-              <a:srgbClr val="282828"/>
-            </a:solidFill>
-            <a:prstDash val="solid"/>
-            <a:round/>
-            <a:headEnd type="none" w="sm" len="sm"/>
-            <a:tailEnd type="none" w="sm" len="sm"/>
-          </a:ln>
-        </p:spPr>
-        <p:txBody>
-          <a:bodyPr spcFirstLastPara="1" wrap="square" lIns="91425" tIns="91425" rIns="91425" bIns="91425" anchor="ctr" anchorCtr="0">
-            <a:noAutofit/>
-          </a:bodyPr>
-          <a:lstStyle/>
-          <a:p>
-            <a:pPr lvl="0" algn="ctr">
+            <a:pPr marL="342900" indent="-342900">
               <a:buClrTx/>
+              <a:buFont typeface="Arial" panose="020B0604020202020204" pitchFamily="34" charset="0"/>
+              <a:buChar char="•"/>
+              <a:defRPr/>
             </a:pPr>
             <a:r>
-              <a:rPr lang="en-US" sz="2400" dirty="0">
+              <a:rPr lang="en-US" sz="2200" dirty="0">
                 <a:solidFill>
                   <a:schemeClr val="bg1"/>
                 </a:solidFill>
                 <a:latin typeface="Segoe UI Semibold"/>
               </a:rPr>
-              <a:t>Azure Free Trial: https://aka.ms/azure/free-trial</a:t>
+              <a:t>aka.ms/Copilot4Students</a:t>
             </a:r>
-            <a:endParaRPr kumimoji="0" lang="en-US" sz="2400" b="0" i="0" u="none" strike="noStrike" kern="1200" cap="none" spc="-38" normalizeH="0" baseline="0" noProof="0" dirty="0">
+          </a:p>
+          <a:p>
+            <a:pPr marL="0" marR="0" lvl="0" indent="0" defTabSz="914400" rtl="0" eaLnBrk="1" fontAlgn="auto" latinLnBrk="0" hangingPunct="1">
+              <a:lnSpc>
+                <a:spcPct val="100000"/>
+              </a:lnSpc>
+              <a:spcBef>
+                <a:spcPts val="0"/>
+              </a:spcBef>
+              <a:spcAft>
+                <a:spcPts val="0"/>
+              </a:spcAft>
+              <a:buClrTx/>
+              <a:buSzTx/>
+              <a:buFont typeface="Arial"/>
+              <a:buNone/>
+              <a:tabLst/>
+              <a:defRPr/>
+            </a:pPr>
+            <a:endParaRPr kumimoji="0" lang="en-US" sz="2200" b="0" i="0" u="none" strike="noStrike" kern="1200" cap="none" spc="-38" normalizeH="0" baseline="0" noProof="0" dirty="0">
+              <a:ln w="3175">
+                <a:noFill/>
+              </a:ln>
+              <a:solidFill>
+                <a:srgbClr val="FFFFFF"/>
+              </a:solidFill>
+              <a:effectLst/>
+              <a:uLnTx/>
+              <a:uFillTx/>
+              <a:latin typeface="Segoe UI Semibold"/>
+              <a:cs typeface="Arial"/>
+              <a:sym typeface="Arial"/>
+            </a:endParaRPr>
+          </a:p>
+          <a:p>
+            <a:pPr>
+              <a:buClrTx/>
+              <a:defRPr/>
+            </a:pPr>
+            <a:r>
+              <a:rPr lang="en-US" sz="2200" dirty="0">
+                <a:solidFill>
+                  <a:srgbClr val="FFC000"/>
+                </a:solidFill>
+                <a:latin typeface="Segoe UI Semibold"/>
+              </a:rPr>
+              <a:t>Azure Free Trial</a:t>
+            </a:r>
+          </a:p>
+          <a:p>
+            <a:pPr marL="342900" indent="-342900">
+              <a:buClrTx/>
+              <a:buFont typeface="Arial" panose="020B0604020202020204" pitchFamily="34" charset="0"/>
+              <a:buChar char="•"/>
+              <a:defRPr/>
+            </a:pPr>
+            <a:r>
+              <a:rPr lang="en-US" sz="2200" dirty="0">
+                <a:solidFill>
+                  <a:schemeClr val="bg1"/>
+                </a:solidFill>
+                <a:latin typeface="Segoe UI Semibold"/>
+              </a:rPr>
+              <a:t>aka.ms/azure/free-trial</a:t>
+            </a:r>
+          </a:p>
+          <a:p>
+            <a:pPr marL="342900" indent="-342900">
+              <a:buClrTx/>
+              <a:buFont typeface="Arial" panose="020B0604020202020204" pitchFamily="34" charset="0"/>
+              <a:buChar char="•"/>
+              <a:defRPr/>
+            </a:pPr>
+            <a:endParaRPr kumimoji="0" lang="en-US" sz="2200" b="0" i="0" u="none" strike="noStrike" kern="1200" cap="none" spc="-38" normalizeH="0" baseline="0" noProof="0" dirty="0">
               <a:ln w="3175">
                 <a:noFill/>
               </a:ln>
@@ -15149,130 +15257,53 @@
               <a:latin typeface="Segoe UI Semibold"/>
             </a:endParaRPr>
           </a:p>
-        </p:txBody>
-      </p:sp>
-      <p:sp>
-        <p:nvSpPr>
-          <p:cNvPr id="10" name="Google Shape;5269;p259">
-            <a:extLst>
-              <a:ext uri="{FF2B5EF4-FFF2-40B4-BE49-F238E27FC236}">
-                <a16:creationId xmlns:a16="http://schemas.microsoft.com/office/drawing/2014/main" id="{93F069A6-63F1-403E-1929-A91D177AC07A}"/>
-              </a:ext>
-            </a:extLst>
-          </p:cNvPr>
-          <p:cNvSpPr/>
-          <p:nvPr/>
-        </p:nvSpPr>
-        <p:spPr>
-          <a:xfrm>
-            <a:off x="2096908" y="2786718"/>
-            <a:ext cx="4572000" cy="18300"/>
-          </a:xfrm>
-          <a:prstGeom prst="roundRect">
-            <a:avLst>
-              <a:gd name="adj" fmla="val 50000"/>
-            </a:avLst>
-          </a:prstGeom>
-          <a:gradFill>
-            <a:gsLst>
-              <a:gs pos="0">
-                <a:schemeClr val="accent3"/>
-              </a:gs>
-              <a:gs pos="15000">
-                <a:schemeClr val="accent6"/>
-              </a:gs>
-              <a:gs pos="37000">
-                <a:schemeClr val="accent2"/>
-              </a:gs>
-              <a:gs pos="58999">
-                <a:schemeClr val="accent5"/>
-              </a:gs>
-              <a:gs pos="81000">
-                <a:schemeClr val="accent1"/>
-              </a:gs>
-              <a:gs pos="100000">
-                <a:schemeClr val="accent4"/>
-              </a:gs>
-            </a:gsLst>
-            <a:lin ang="8099331" scaled="0"/>
-          </a:gradFill>
-          <a:ln>
-            <a:noFill/>
-          </a:ln>
-        </p:spPr>
-        <p:txBody>
-          <a:bodyPr spcFirstLastPara="1" wrap="square" lIns="91425" tIns="91425" rIns="91425" bIns="91425" anchor="ctr" anchorCtr="0">
-            <a:noAutofit/>
-          </a:bodyPr>
-          <a:lstStyle/>
           <a:p>
-            <a:pPr marL="0" lvl="0" indent="0" algn="l" rtl="0">
-              <a:spcBef>
-                <a:spcPts val="0"/>
-              </a:spcBef>
-              <a:spcAft>
-                <a:spcPts val="0"/>
-              </a:spcAft>
-              <a:buNone/>
-            </a:pPr>
-            <a:endParaRPr/>
-          </a:p>
-        </p:txBody>
-      </p:sp>
-      <p:sp>
-        <p:nvSpPr>
-          <p:cNvPr id="11" name="Google Shape;5260;p259">
-            <a:extLst>
-              <a:ext uri="{FF2B5EF4-FFF2-40B4-BE49-F238E27FC236}">
-                <a16:creationId xmlns:a16="http://schemas.microsoft.com/office/drawing/2014/main" id="{7241B7AD-CE0C-1D65-D9F8-18942F86B964}"/>
-              </a:ext>
-            </a:extLst>
-          </p:cNvPr>
-          <p:cNvSpPr/>
-          <p:nvPr/>
-        </p:nvSpPr>
-        <p:spPr>
-          <a:xfrm>
-            <a:off x="496708" y="3253068"/>
-            <a:ext cx="7772400" cy="914400"/>
-          </a:xfrm>
-          <a:prstGeom prst="roundRect">
-            <a:avLst>
-              <a:gd name="adj" fmla="val 9524"/>
-            </a:avLst>
-          </a:prstGeom>
-          <a:solidFill>
-            <a:srgbClr val="0A0C10"/>
-          </a:solidFill>
-          <a:ln w="9525" cap="flat" cmpd="sng">
-            <a:solidFill>
-              <a:srgbClr val="282828"/>
-            </a:solidFill>
-            <a:prstDash val="solid"/>
-            <a:round/>
-            <a:headEnd type="none" w="sm" len="sm"/>
-            <a:tailEnd type="none" w="sm" len="sm"/>
-          </a:ln>
-        </p:spPr>
-        <p:txBody>
-          <a:bodyPr spcFirstLastPara="1" wrap="square" lIns="91425" tIns="91425" rIns="91425" bIns="91425" anchor="ctr" anchorCtr="0">
-            <a:noAutofit/>
-          </a:bodyPr>
-          <a:lstStyle/>
-          <a:p>
-            <a:pPr lvl="0" algn="ctr">
+            <a:pPr>
               <a:buClrTx/>
+              <a:defRPr/>
             </a:pPr>
             <a:r>
-              <a:rPr lang="en-US" sz="2800" dirty="0">
-                <a:solidFill>
-                  <a:schemeClr val="bg1"/>
+              <a:rPr lang="en-US" sz="2200" dirty="0">
+                <a:solidFill>
+                  <a:srgbClr val="FFC000"/>
                 </a:solidFill>
                 <a:latin typeface="Segoe UI Semibold"/>
               </a:rPr>
-              <a:t>https://github.com/features/codespaces</a:t>
+              <a:t>GitHub </a:t>
             </a:r>
-            <a:endParaRPr kumimoji="0" lang="en-US" sz="2800" b="0" i="0" u="none" strike="noStrike" kern="1200" cap="none" spc="-38" normalizeH="0" baseline="0" noProof="0" dirty="0">
+            <a:r>
+              <a:rPr lang="en-US" sz="2200" dirty="0" err="1">
+                <a:solidFill>
+                  <a:srgbClr val="FFC000"/>
+                </a:solidFill>
+                <a:latin typeface="Segoe UI Semibold"/>
+              </a:rPr>
+              <a:t>Codespaces</a:t>
+            </a:r>
+            <a:endParaRPr lang="en-US" sz="2200" dirty="0">
+              <a:solidFill>
+                <a:srgbClr val="FFC000"/>
+              </a:solidFill>
+              <a:latin typeface="Segoe UI Semibold"/>
+            </a:endParaRPr>
+          </a:p>
+          <a:p>
+            <a:pPr marL="342900" indent="-342900">
+              <a:buClrTx/>
+              <a:buFont typeface="Arial" panose="020B0604020202020204" pitchFamily="34" charset="0"/>
+              <a:buChar char="•"/>
+              <a:defRPr/>
+            </a:pPr>
+            <a:r>
+              <a:rPr lang="en-US" sz="2200" dirty="0">
+                <a:solidFill>
+                  <a:schemeClr val="bg1"/>
+                </a:solidFill>
+                <a:latin typeface="Segoe UI Semibold"/>
+              </a:rPr>
+              <a:t>github.com/features/codespaces</a:t>
+            </a:r>
+            <a:endParaRPr kumimoji="0" lang="en-US" sz="2200" b="0" i="0" u="none" strike="noStrike" kern="1200" cap="none" spc="-38" normalizeH="0" baseline="0" noProof="0" dirty="0">
               <a:ln w="3175">
                 <a:noFill/>
               </a:ln>
@@ -15285,76 +15316,212 @@
               <a:latin typeface="Segoe UI Semibold"/>
             </a:endParaRPr>
           </a:p>
+          <a:p>
+            <a:pPr>
+              <a:buClrTx/>
+              <a:defRPr/>
+            </a:pPr>
+            <a:endParaRPr kumimoji="0" lang="en-US" sz="2200" b="0" i="0" u="none" strike="noStrike" kern="1200" cap="none" spc="-38" normalizeH="0" baseline="0" noProof="0" dirty="0">
+              <a:ln w="3175">
+                <a:noFill/>
+              </a:ln>
+              <a:solidFill>
+                <a:schemeClr val="bg1"/>
+              </a:solidFill>
+              <a:effectLst/>
+              <a:uLnTx/>
+              <a:uFillTx/>
+              <a:latin typeface="Segoe UI Semibold"/>
+            </a:endParaRPr>
+          </a:p>
+          <a:p>
+            <a:pPr>
+              <a:buClrTx/>
+              <a:defRPr/>
+            </a:pPr>
+            <a:r>
+              <a:rPr lang="en-US" sz="2200" dirty="0">
+                <a:solidFill>
+                  <a:srgbClr val="FFC000"/>
+                </a:solidFill>
+                <a:latin typeface="Segoe UI Semibold"/>
+              </a:rPr>
+              <a:t>GitHub Copilot (60-day trial)</a:t>
+            </a:r>
+          </a:p>
+          <a:p>
+            <a:pPr marL="342900" marR="0" lvl="0" indent="-342900" defTabSz="914400" rtl="0" eaLnBrk="1" fontAlgn="auto" latinLnBrk="0" hangingPunct="1">
+              <a:lnSpc>
+                <a:spcPct val="100000"/>
+              </a:lnSpc>
+              <a:spcBef>
+                <a:spcPts val="0"/>
+              </a:spcBef>
+              <a:spcAft>
+                <a:spcPts val="0"/>
+              </a:spcAft>
+              <a:buClrTx/>
+              <a:buSzTx/>
+              <a:buFont typeface="Arial" panose="020B0604020202020204" pitchFamily="34" charset="0"/>
+              <a:buChar char="•"/>
+              <a:tabLst/>
+              <a:defRPr/>
+            </a:pPr>
+            <a:r>
+              <a:rPr lang="en-US" sz="2200" kern="1200" spc="-38" dirty="0">
+                <a:ln w="3175">
+                  <a:noFill/>
+                </a:ln>
+                <a:solidFill>
+                  <a:srgbClr val="FFFFFF"/>
+                </a:solidFill>
+                <a:latin typeface="Segoe UI Semibold"/>
+              </a:rPr>
+              <a:t>github.com/features/copilot</a:t>
+            </a:r>
+            <a:endParaRPr kumimoji="0" lang="en-US" sz="2200" b="0" i="0" u="none" strike="noStrike" kern="1200" cap="none" spc="-38" normalizeH="0" baseline="0" noProof="0" dirty="0">
+              <a:ln w="3175">
+                <a:noFill/>
+              </a:ln>
+              <a:solidFill>
+                <a:srgbClr val="FFFFFF"/>
+              </a:solidFill>
+              <a:effectLst/>
+              <a:uLnTx/>
+              <a:uFillTx/>
+              <a:latin typeface="Segoe UI Semibold"/>
+              <a:cs typeface="Arial"/>
+              <a:sym typeface="Arial"/>
+            </a:endParaRPr>
+          </a:p>
         </p:txBody>
       </p:sp>
-      <p:sp>
-        <p:nvSpPr>
-          <p:cNvPr id="13" name="Google Shape;5269;p259">
+      <p:grpSp>
+        <p:nvGrpSpPr>
+          <p:cNvPr id="8" name="Group 7">
             <a:extLst>
               <a:ext uri="{FF2B5EF4-FFF2-40B4-BE49-F238E27FC236}">
-                <a16:creationId xmlns:a16="http://schemas.microsoft.com/office/drawing/2014/main" id="{7FC9DE0F-FDD4-3A39-B6AF-F7DD9B94C8E8}"/>
+                <a16:creationId xmlns:a16="http://schemas.microsoft.com/office/drawing/2014/main" id="{51811524-BCD4-1BCC-B860-C17C4A4B787A}"/>
               </a:ext>
             </a:extLst>
           </p:cNvPr>
-          <p:cNvSpPr/>
+          <p:cNvGrpSpPr/>
           <p:nvPr/>
-        </p:nvSpPr>
-        <p:spPr>
+        </p:nvGrpSpPr>
+        <p:grpSpPr>
           <a:xfrm>
-            <a:off x="2096908" y="4158318"/>
-            <a:ext cx="4572000" cy="18300"/>
+            <a:off x="-107951" y="4739053"/>
+            <a:ext cx="9359901" cy="395260"/>
+            <a:chOff x="0" y="12179547"/>
+            <a:chExt cx="23376732" cy="987178"/>
           </a:xfrm>
-          <a:prstGeom prst="roundRect">
-            <a:avLst>
-              <a:gd name="adj" fmla="val 50000"/>
-            </a:avLst>
-          </a:prstGeom>
-          <a:gradFill>
-            <a:gsLst>
-              <a:gs pos="0">
-                <a:schemeClr val="accent3"/>
-              </a:gs>
-              <a:gs pos="15000">
-                <a:schemeClr val="accent6"/>
-              </a:gs>
-              <a:gs pos="37000">
-                <a:schemeClr val="accent2"/>
-              </a:gs>
-              <a:gs pos="58999">
-                <a:schemeClr val="accent5"/>
-              </a:gs>
-              <a:gs pos="81000">
-                <a:schemeClr val="accent1"/>
-              </a:gs>
-              <a:gs pos="100000">
-                <a:schemeClr val="accent4"/>
-              </a:gs>
-            </a:gsLst>
-            <a:lin ang="8099331" scaled="0"/>
-          </a:gradFill>
-          <a:ln>
-            <a:noFill/>
-          </a:ln>
-        </p:spPr>
-        <p:txBody>
-          <a:bodyPr spcFirstLastPara="1" wrap="square" lIns="91425" tIns="91425" rIns="91425" bIns="91425" anchor="ctr" anchorCtr="0">
-            <a:noAutofit/>
-          </a:bodyPr>
-          <a:lstStyle/>
-          <a:p>
-            <a:pPr marL="0" lvl="0" indent="0" algn="l" rtl="0">
-              <a:spcBef>
-                <a:spcPts val="0"/>
-              </a:spcBef>
-              <a:spcAft>
-                <a:spcPts val="0"/>
-              </a:spcAft>
-              <a:buNone/>
-            </a:pPr>
-            <a:endParaRPr/>
-          </a:p>
-        </p:txBody>
-      </p:sp>
+        </p:grpSpPr>
+        <p:pic>
+          <p:nvPicPr>
+            <p:cNvPr id="9" name="Picture 8" descr="A colorful lines and dots&#10;&#10;Description automatically generated">
+              <a:extLst>
+                <a:ext uri="{FF2B5EF4-FFF2-40B4-BE49-F238E27FC236}">
+                  <a16:creationId xmlns:a16="http://schemas.microsoft.com/office/drawing/2014/main" id="{0E4CD3FD-2DF2-315C-2D27-62865C84A887}"/>
+                </a:ext>
+              </a:extLst>
+            </p:cNvPr>
+            <p:cNvPicPr>
+              <a:picLocks noChangeAspect="1"/>
+            </p:cNvPicPr>
+            <p:nvPr userDrawn="1"/>
+          </p:nvPicPr>
+          <p:blipFill rotWithShape="1">
+            <a:blip r:embed="rId3">
+              <a:extLst>
+                <a:ext uri="{28A0092B-C50C-407E-A947-70E740481C1C}">
+                  <a14:useLocalDpi xmlns:a14="http://schemas.microsoft.com/office/drawing/2010/main" val="0"/>
+                </a:ext>
+              </a:extLst>
+            </a:blip>
+            <a:srcRect b="80810"/>
+            <a:stretch/>
+          </p:blipFill>
+          <p:spPr>
+            <a:xfrm>
+              <a:off x="14231456" y="12179547"/>
+              <a:ext cx="9145276" cy="987178"/>
+            </a:xfrm>
+            <a:prstGeom prst="rect">
+              <a:avLst/>
+            </a:prstGeom>
+          </p:spPr>
+        </p:pic>
+        <p:pic>
+          <p:nvPicPr>
+            <p:cNvPr id="12" name="Picture 11" descr="A colorful lines and dots&#10;&#10;Description automatically generated">
+              <a:extLst>
+                <a:ext uri="{FF2B5EF4-FFF2-40B4-BE49-F238E27FC236}">
+                  <a16:creationId xmlns:a16="http://schemas.microsoft.com/office/drawing/2014/main" id="{9CDF7C33-5055-A2F7-CA5D-42C9B728C0F6}"/>
+                </a:ext>
+              </a:extLst>
+            </p:cNvPr>
+            <p:cNvPicPr>
+              <a:picLocks noChangeAspect="1"/>
+            </p:cNvPicPr>
+            <p:nvPr userDrawn="1"/>
+          </p:nvPicPr>
+          <p:blipFill rotWithShape="1">
+            <a:blip r:embed="rId3">
+              <a:extLst>
+                <a:ext uri="{28A0092B-C50C-407E-A947-70E740481C1C}">
+                  <a14:useLocalDpi xmlns:a14="http://schemas.microsoft.com/office/drawing/2010/main" val="0"/>
+                </a:ext>
+              </a:extLst>
+            </a:blip>
+            <a:srcRect b="80810"/>
+            <a:stretch/>
+          </p:blipFill>
+          <p:spPr>
+            <a:xfrm flipH="1">
+              <a:off x="5086180" y="12179547"/>
+              <a:ext cx="9145276" cy="987178"/>
+            </a:xfrm>
+            <a:prstGeom prst="rect">
+              <a:avLst/>
+            </a:prstGeom>
+          </p:spPr>
+        </p:pic>
+        <p:pic>
+          <p:nvPicPr>
+            <p:cNvPr id="14" name="Picture 13" descr="A colorful lines and dots&#10;&#10;Description automatically generated">
+              <a:extLst>
+                <a:ext uri="{FF2B5EF4-FFF2-40B4-BE49-F238E27FC236}">
+                  <a16:creationId xmlns:a16="http://schemas.microsoft.com/office/drawing/2014/main" id="{1A40FEBA-586B-67B3-5FC4-781C1A6602C1}"/>
+                </a:ext>
+              </a:extLst>
+            </p:cNvPr>
+            <p:cNvPicPr>
+              <a:picLocks noChangeAspect="1"/>
+            </p:cNvPicPr>
+            <p:nvPr userDrawn="1"/>
+          </p:nvPicPr>
+          <p:blipFill rotWithShape="1">
+            <a:blip r:embed="rId3">
+              <a:extLst>
+                <a:ext uri="{28A0092B-C50C-407E-A947-70E740481C1C}">
+                  <a14:useLocalDpi xmlns:a14="http://schemas.microsoft.com/office/drawing/2010/main" val="0"/>
+                </a:ext>
+              </a:extLst>
+            </a:blip>
+            <a:srcRect l="44384" b="80810"/>
+            <a:stretch/>
+          </p:blipFill>
+          <p:spPr>
+            <a:xfrm>
+              <a:off x="0" y="12179547"/>
+              <a:ext cx="5086180" cy="987178"/>
+            </a:xfrm>
+            <a:prstGeom prst="rect">
+              <a:avLst/>
+            </a:prstGeom>
+          </p:spPr>
+        </p:pic>
+      </p:grpSp>
     </p:spTree>
     <p:extLst>
       <p:ext uri="{BB962C8B-B14F-4D97-AF65-F5344CB8AC3E}">

</xml_diff>